<commit_message>
Added twemoji as submodule; added ICFP SRC submission; reset doc/thesis directory.
</commit_message>
<xml_diff>
--- a/doc/ppar-jun-2017/PPar IEE Slides.pptx
+++ b/doc/ppar-jun-2017/PPar IEE Slides.pptx
@@ -121,6 +121,11 @@
       </a:defRPr>
     </a:lvl9pPr>
   </p:defaultTextStyle>
+  <p:extLst>
+    <p:ext uri="{EFAFB233-063F-42B5-8137-9DF3F51BA10A}">
+      <p15:sldGuideLst xmlns:p15="http://schemas.microsoft.com/office/powerpoint/2012/main"/>
+    </p:ext>
+  </p:extLst>
 </p:presentation>
 </file>
 
@@ -637,7 +642,7 @@
           <a:p>
             <a:fld id="{93143B3A-499E-6C4C-820E-2FC0089BE648}" type="datetimeFigureOut">
               <a:rPr lang="en-US" smtClean="0"/>
-              <a:t>6/5/17</a:t>
+              <a:t>6/7/17</a:t>
             </a:fld>
             <a:endParaRPr lang="en-US"/>
           </a:p>
@@ -802,7 +807,7 @@
           <a:p>
             <a:fld id="{93143B3A-499E-6C4C-820E-2FC0089BE648}" type="datetimeFigureOut">
               <a:rPr lang="en-US" smtClean="0"/>
-              <a:t>6/5/17</a:t>
+              <a:t>6/7/17</a:t>
             </a:fld>
             <a:endParaRPr lang="en-US"/>
           </a:p>
@@ -977,7 +982,7 @@
           <a:p>
             <a:fld id="{93143B3A-499E-6C4C-820E-2FC0089BE648}" type="datetimeFigureOut">
               <a:rPr lang="en-US" smtClean="0"/>
-              <a:t>6/5/17</a:t>
+              <a:t>6/7/17</a:t>
             </a:fld>
             <a:endParaRPr lang="en-US"/>
           </a:p>
@@ -1142,7 +1147,7 @@
           <a:p>
             <a:fld id="{93143B3A-499E-6C4C-820E-2FC0089BE648}" type="datetimeFigureOut">
               <a:rPr lang="en-US" smtClean="0"/>
-              <a:t>6/5/17</a:t>
+              <a:t>6/7/17</a:t>
             </a:fld>
             <a:endParaRPr lang="en-US"/>
           </a:p>
@@ -1405,7 +1410,7 @@
           <a:p>
             <a:fld id="{93143B3A-499E-6C4C-820E-2FC0089BE648}" type="datetimeFigureOut">
               <a:rPr lang="en-US" smtClean="0"/>
-              <a:t>6/5/17</a:t>
+              <a:t>6/7/17</a:t>
             </a:fld>
             <a:endParaRPr lang="en-US"/>
           </a:p>
@@ -1632,7 +1637,7 @@
           <a:p>
             <a:fld id="{93143B3A-499E-6C4C-820E-2FC0089BE648}" type="datetimeFigureOut">
               <a:rPr lang="en-US" smtClean="0"/>
-              <a:t>6/5/17</a:t>
+              <a:t>6/7/17</a:t>
             </a:fld>
             <a:endParaRPr lang="en-US"/>
           </a:p>
@@ -1986,7 +1991,7 @@
           <a:p>
             <a:fld id="{93143B3A-499E-6C4C-820E-2FC0089BE648}" type="datetimeFigureOut">
               <a:rPr lang="en-US" smtClean="0"/>
-              <a:t>6/5/17</a:t>
+              <a:t>6/7/17</a:t>
             </a:fld>
             <a:endParaRPr lang="en-US"/>
           </a:p>
@@ -2122,7 +2127,7 @@
           <a:p>
             <a:fld id="{93143B3A-499E-6C4C-820E-2FC0089BE648}" type="datetimeFigureOut">
               <a:rPr lang="en-US" smtClean="0"/>
-              <a:t>6/5/17</a:t>
+              <a:t>6/7/17</a:t>
             </a:fld>
             <a:endParaRPr lang="en-US"/>
           </a:p>
@@ -2212,7 +2217,7 @@
           <a:p>
             <a:fld id="{93143B3A-499E-6C4C-820E-2FC0089BE648}" type="datetimeFigureOut">
               <a:rPr lang="en-US" smtClean="0"/>
-              <a:t>6/5/17</a:t>
+              <a:t>6/7/17</a:t>
             </a:fld>
             <a:endParaRPr lang="en-US"/>
           </a:p>
@@ -2564,7 +2569,7 @@
           <a:p>
             <a:fld id="{93143B3A-499E-6C4C-820E-2FC0089BE648}" type="datetimeFigureOut">
               <a:rPr lang="en-US" smtClean="0"/>
-              <a:t>6/5/17</a:t>
+              <a:t>6/7/17</a:t>
             </a:fld>
             <a:endParaRPr lang="en-US"/>
           </a:p>
@@ -2916,7 +2921,7 @@
           <a:p>
             <a:fld id="{93143B3A-499E-6C4C-820E-2FC0089BE648}" type="datetimeFigureOut">
               <a:rPr lang="en-US" smtClean="0"/>
-              <a:t>6/5/17</a:t>
+              <a:t>6/7/17</a:t>
             </a:fld>
             <a:endParaRPr lang="en-US"/>
           </a:p>
@@ -3152,7 +3157,7 @@
           <a:p>
             <a:fld id="{93143B3A-499E-6C4C-820E-2FC0089BE648}" type="datetimeFigureOut">
               <a:rPr lang="en-US" smtClean="0"/>
-              <a:t>6/5/17</a:t>
+              <a:t>6/7/17</a:t>
             </a:fld>
             <a:endParaRPr lang="en-US"/>
           </a:p>
@@ -4633,7 +4638,7 @@
           <p:nvPr>
             <p:extLst>
               <p:ext uri="{D42A27DB-BD31-4B8C-83A1-F6EECF244321}">
-                <p14:modId xmlns:p14="http://schemas.microsoft.com/office/powerpoint/2010/main" val="627262506"/>
+                <p14:modId xmlns:p14="http://schemas.microsoft.com/office/powerpoint/2010/main" val="27002521"/>
               </p:ext>
             </p:extLst>
           </p:nvPr>
@@ -4773,7 +4778,7 @@
                           <a:ea typeface="Helvetica Rounded" charset="0"/>
                           <a:cs typeface="Helvetica Rounded" charset="0"/>
                         </a:rPr>
-                        <a:t>No Races</a:t>
+                        <a:t>Races</a:t>
                       </a:r>
                     </a:p>
                     <a:p>
@@ -4791,16 +4796,6 @@
                         </a:rPr>
                         <a:t>No Deadlocks</a:t>
                       </a:r>
-                      <a:endParaRPr lang="en-US" sz="4000" b="1" i="0" dirty="0" smtClean="0">
-                        <a:solidFill>
-                          <a:schemeClr val="bg1">
-                            <a:lumMod val="95000"/>
-                          </a:schemeClr>
-                        </a:solidFill>
-                        <a:latin typeface="Helvetica Rounded" charset="0"/>
-                        <a:ea typeface="Helvetica Rounded" charset="0"/>
-                        <a:cs typeface="Helvetica Rounded" charset="0"/>
-                      </a:endParaRPr>
                     </a:p>
                     <a:p>
                       <a:pPr algn="ctr"/>
@@ -4828,24 +4823,11 @@
                           <a:ea typeface="Helvetica Rounded" charset="0"/>
                           <a:cs typeface="Helvetica Rounded" charset="0"/>
                         </a:rPr>
-                        <a:t>πDILL</a:t>
+                        <a:t>My research</a:t>
                       </a:r>
                     </a:p>
                     <a:p>
                       <a:pPr algn="ctr"/>
-                      <a:r>
-                        <a:rPr lang="en-US" sz="4000" b="1" i="0" dirty="0" smtClean="0">
-                          <a:solidFill>
-                            <a:schemeClr val="bg1">
-                              <a:lumMod val="95000"/>
-                            </a:schemeClr>
-                          </a:solidFill>
-                          <a:latin typeface="Helvetica Rounded" charset="0"/>
-                          <a:ea typeface="Helvetica Rounded" charset="0"/>
-                          <a:cs typeface="Helvetica Rounded" charset="0"/>
-                        </a:rPr>
-                        <a:t>CP</a:t>
-                      </a:r>
                       <a:endParaRPr lang="en-US" sz="4000" b="1" i="0" dirty="0" smtClean="0">
                         <a:solidFill>
                           <a:schemeClr val="bg1">
@@ -4901,7 +4883,7 @@
                           <a:ea typeface="Helvetica Rounded" charset="0"/>
                           <a:cs typeface="Helvetica Rounded" charset="0"/>
                         </a:rPr>
-                        <a:t>Races</a:t>
+                        <a:t>No Races</a:t>
                       </a:r>
                     </a:p>
                     <a:p>
@@ -4946,12 +4928,25 @@
                           <a:ea typeface="Helvetica Rounded" charset="0"/>
                           <a:cs typeface="Helvetica Rounded" charset="0"/>
                         </a:rPr>
-                        <a:t>My research</a:t>
+                        <a:t>πDILL</a:t>
                       </a:r>
                     </a:p>
                     <a:p>
                       <a:pPr algn="ctr"/>
-                      <a:endParaRPr lang="en-US" sz="4000" b="1" i="0" dirty="0">
+                      <a:r>
+                        <a:rPr lang="en-US" sz="4000" b="1" i="0" smtClean="0">
+                          <a:solidFill>
+                            <a:schemeClr val="bg1">
+                              <a:lumMod val="95000"/>
+                            </a:schemeClr>
+                          </a:solidFill>
+                          <a:latin typeface="Helvetica Rounded" charset="0"/>
+                          <a:ea typeface="Helvetica Rounded" charset="0"/>
+                          <a:cs typeface="Helvetica Rounded" charset="0"/>
+                        </a:rPr>
+                        <a:t>CP</a:t>
+                      </a:r>
+                      <a:endParaRPr lang="en-US" sz="4000" b="1" i="0" dirty="0" smtClean="0">
                         <a:solidFill>
                           <a:schemeClr val="bg1">
                             <a:lumMod val="95000"/>

</xml_diff>